<commit_message>
Updated db scripts and completed final presentation powerpoint.
</commit_message>
<xml_diff>
--- a/Diagrams/Senior Project - Assignment 2.pptx
+++ b/Diagrams/Senior Project - Assignment 2.pptx
@@ -6,6 +6,13 @@
   </p:sldMasterIdLst>
   <p:sldIdLst>
     <p:sldId id="257" r:id="rId2"/>
+    <p:sldId id="258" r:id="rId3"/>
+    <p:sldId id="264" r:id="rId4"/>
+    <p:sldId id="259" r:id="rId5"/>
+    <p:sldId id="260" r:id="rId6"/>
+    <p:sldId id="261" r:id="rId7"/>
+    <p:sldId id="262" r:id="rId8"/>
+    <p:sldId id="263" r:id="rId9"/>
   </p:sldIdLst>
   <p:sldSz cx="12192000" cy="6858000"/>
   <p:notesSz cx="6858000" cy="9144000"/>
@@ -104,6 +111,11 @@
       </a:defRPr>
     </a:lvl9pPr>
   </p:defaultTextStyle>
+  <p:extLst>
+    <p:ext uri="{EFAFB233-063F-42B5-8137-9DF3F51BA10A}">
+      <p15:sldGuideLst xmlns:p15="http://schemas.microsoft.com/office/powerpoint/2012/main"/>
+    </p:ext>
+  </p:extLst>
 </p:presentation>
 </file>
 
@@ -270,7 +282,7 @@
           <a:p>
             <a:fld id="{925817FA-CBE3-5D4B-BFAB-D6E10B09A296}" type="datetimeFigureOut">
               <a:rPr lang="en-US" smtClean="0"/>
-              <a:t>1/27/17</a:t>
+              <a:t>3/3/17</a:t>
             </a:fld>
             <a:endParaRPr lang="en-US"/>
           </a:p>
@@ -435,7 +447,7 @@
           <a:p>
             <a:fld id="{925817FA-CBE3-5D4B-BFAB-D6E10B09A296}" type="datetimeFigureOut">
               <a:rPr lang="en-US" smtClean="0"/>
-              <a:t>1/27/17</a:t>
+              <a:t>3/3/17</a:t>
             </a:fld>
             <a:endParaRPr lang="en-US"/>
           </a:p>
@@ -610,7 +622,7 @@
           <a:p>
             <a:fld id="{925817FA-CBE3-5D4B-BFAB-D6E10B09A296}" type="datetimeFigureOut">
               <a:rPr lang="en-US" smtClean="0"/>
-              <a:t>1/27/17</a:t>
+              <a:t>3/3/17</a:t>
             </a:fld>
             <a:endParaRPr lang="en-US"/>
           </a:p>
@@ -775,7 +787,7 @@
           <a:p>
             <a:fld id="{925817FA-CBE3-5D4B-BFAB-D6E10B09A296}" type="datetimeFigureOut">
               <a:rPr lang="en-US" smtClean="0"/>
-              <a:t>1/27/17</a:t>
+              <a:t>3/3/17</a:t>
             </a:fld>
             <a:endParaRPr lang="en-US"/>
           </a:p>
@@ -1038,7 +1050,7 @@
           <a:p>
             <a:fld id="{925817FA-CBE3-5D4B-BFAB-D6E10B09A296}" type="datetimeFigureOut">
               <a:rPr lang="en-US" smtClean="0"/>
-              <a:t>1/27/17</a:t>
+              <a:t>3/3/17</a:t>
             </a:fld>
             <a:endParaRPr lang="en-US"/>
           </a:p>
@@ -1265,7 +1277,7 @@
           <a:p>
             <a:fld id="{925817FA-CBE3-5D4B-BFAB-D6E10B09A296}" type="datetimeFigureOut">
               <a:rPr lang="en-US" smtClean="0"/>
-              <a:t>1/27/17</a:t>
+              <a:t>3/3/17</a:t>
             </a:fld>
             <a:endParaRPr lang="en-US"/>
           </a:p>
@@ -1619,7 +1631,7 @@
           <a:p>
             <a:fld id="{925817FA-CBE3-5D4B-BFAB-D6E10B09A296}" type="datetimeFigureOut">
               <a:rPr lang="en-US" smtClean="0"/>
-              <a:t>1/27/17</a:t>
+              <a:t>3/3/17</a:t>
             </a:fld>
             <a:endParaRPr lang="en-US"/>
           </a:p>
@@ -1755,7 +1767,7 @@
           <a:p>
             <a:fld id="{925817FA-CBE3-5D4B-BFAB-D6E10B09A296}" type="datetimeFigureOut">
               <a:rPr lang="en-US" smtClean="0"/>
-              <a:t>1/27/17</a:t>
+              <a:t>3/3/17</a:t>
             </a:fld>
             <a:endParaRPr lang="en-US"/>
           </a:p>
@@ -1845,7 +1857,7 @@
           <a:p>
             <a:fld id="{925817FA-CBE3-5D4B-BFAB-D6E10B09A296}" type="datetimeFigureOut">
               <a:rPr lang="en-US" smtClean="0"/>
-              <a:t>1/27/17</a:t>
+              <a:t>3/3/17</a:t>
             </a:fld>
             <a:endParaRPr lang="en-US"/>
           </a:p>
@@ -2197,7 +2209,7 @@
           <a:p>
             <a:fld id="{925817FA-CBE3-5D4B-BFAB-D6E10B09A296}" type="datetimeFigureOut">
               <a:rPr lang="en-US" smtClean="0"/>
-              <a:t>1/27/17</a:t>
+              <a:t>3/3/17</a:t>
             </a:fld>
             <a:endParaRPr lang="en-US"/>
           </a:p>
@@ -2549,7 +2561,7 @@
           <a:p>
             <a:fld id="{925817FA-CBE3-5D4B-BFAB-D6E10B09A296}" type="datetimeFigureOut">
               <a:rPr lang="en-US" smtClean="0"/>
-              <a:t>1/27/17</a:t>
+              <a:t>3/3/17</a:t>
             </a:fld>
             <a:endParaRPr lang="en-US"/>
           </a:p>
@@ -2785,7 +2797,7 @@
           <a:p>
             <a:fld id="{925817FA-CBE3-5D4B-BFAB-D6E10B09A296}" type="datetimeFigureOut">
               <a:rPr lang="en-US" smtClean="0"/>
-              <a:t>1/27/17</a:t>
+              <a:t>3/3/17</a:t>
             </a:fld>
             <a:endParaRPr lang="en-US"/>
           </a:p>
@@ -3340,6 +3352,675 @@
   <p:clrMapOvr>
     <a:masterClrMapping/>
   </p:clrMapOvr>
+  <p:timing>
+    <p:tnLst>
+      <p:par>
+        <p:cTn id="1" dur="indefinite" restart="never" nodeType="tmRoot"/>
+      </p:par>
+    </p:tnLst>
+  </p:timing>
+</p:sld>
+</file>
+
+<file path=ppt/slides/slide2.xml><?xml version="1.0" encoding="utf-8"?>
+<p:sld xmlns:a="http://schemas.openxmlformats.org/drawingml/2006/main" xmlns:r="http://schemas.openxmlformats.org/officeDocument/2006/relationships" xmlns:p="http://schemas.openxmlformats.org/presentationml/2006/main">
+  <p:cSld>
+    <p:spTree>
+      <p:nvGrpSpPr>
+        <p:cNvPr id="1" name=""/>
+        <p:cNvGrpSpPr/>
+        <p:nvPr/>
+      </p:nvGrpSpPr>
+      <p:grpSpPr>
+        <a:xfrm>
+          <a:off x="0" y="0"/>
+          <a:ext cx="0" cy="0"/>
+          <a:chOff x="0" y="0"/>
+          <a:chExt cx="0" cy="0"/>
+        </a:xfrm>
+      </p:grpSpPr>
+      <p:sp>
+        <p:nvSpPr>
+          <p:cNvPr id="2" name="Title 1"/>
+          <p:cNvSpPr>
+            <a:spLocks noGrp="1"/>
+          </p:cNvSpPr>
+          <p:nvPr>
+            <p:ph type="title"/>
+          </p:nvPr>
+        </p:nvSpPr>
+        <p:spPr/>
+        <p:txBody>
+          <a:bodyPr/>
+          <a:lstStyle/>
+          <a:p>
+            <a:r>
+              <a:rPr lang="en-US" dirty="0" smtClean="0"/>
+              <a:t>Project Description</a:t>
+            </a:r>
+            <a:endParaRPr lang="en-US" dirty="0"/>
+          </a:p>
+        </p:txBody>
+      </p:sp>
+      <p:sp>
+        <p:nvSpPr>
+          <p:cNvPr id="3" name="TextBox 2"/>
+          <p:cNvSpPr txBox="1"/>
+          <p:nvPr/>
+        </p:nvSpPr>
+        <p:spPr>
+          <a:xfrm>
+            <a:off x="2231136" y="2713322"/>
+            <a:ext cx="7926416" cy="3046988"/>
+          </a:xfrm>
+          <a:prstGeom prst="rect">
+            <a:avLst/>
+          </a:prstGeom>
+          <a:noFill/>
+        </p:spPr>
+        <p:txBody>
+          <a:bodyPr wrap="square" rtlCol="0">
+            <a:spAutoFit/>
+          </a:bodyPr>
+          <a:lstStyle/>
+          <a:p>
+            <a:pPr marL="285750" indent="-285750">
+              <a:buFont typeface="Arial" charset="0"/>
+              <a:buChar char="•"/>
+            </a:pPr>
+            <a:r>
+              <a:rPr lang="en-US" sz="2400" dirty="0" smtClean="0"/>
+              <a:t>Scalable Ingredients</a:t>
+            </a:r>
+          </a:p>
+          <a:p>
+            <a:pPr marL="742950" lvl="1" indent="-285750">
+              <a:buFont typeface="Arial" charset="0"/>
+              <a:buChar char="•"/>
+            </a:pPr>
+            <a:r>
+              <a:rPr lang="en-US" sz="2400" dirty="0" smtClean="0"/>
+              <a:t>Prepare and cook any recipe for any amount of guests.</a:t>
+            </a:r>
+            <a:endParaRPr lang="en-US" sz="2400" dirty="0"/>
+          </a:p>
+          <a:p>
+            <a:pPr marL="285750" indent="-285750">
+              <a:buFont typeface="Arial" charset="0"/>
+              <a:buChar char="•"/>
+            </a:pPr>
+            <a:r>
+              <a:rPr lang="en-US" sz="2400" dirty="0" smtClean="0"/>
+              <a:t>Browse Global Recipes</a:t>
+            </a:r>
+          </a:p>
+          <a:p>
+            <a:pPr marL="285750" indent="-285750">
+              <a:buFont typeface="Arial" charset="0"/>
+              <a:buChar char="•"/>
+            </a:pPr>
+            <a:r>
+              <a:rPr lang="en-US" sz="2400" dirty="0" smtClean="0"/>
+              <a:t>Favorite Recipes</a:t>
+            </a:r>
+          </a:p>
+          <a:p>
+            <a:pPr marL="285750" indent="-285750">
+              <a:buFont typeface="Arial" charset="0"/>
+              <a:buChar char="•"/>
+            </a:pPr>
+            <a:r>
+              <a:rPr lang="en-US" sz="2400" dirty="0" smtClean="0"/>
+              <a:t>Create &amp; Write Recipes</a:t>
+            </a:r>
+          </a:p>
+          <a:p>
+            <a:pPr marL="285750" indent="-285750">
+              <a:buFont typeface="Arial" charset="0"/>
+              <a:buChar char="•"/>
+            </a:pPr>
+            <a:r>
+              <a:rPr lang="en-US" sz="2400" dirty="0" smtClean="0"/>
+              <a:t>Share Recipes With Friends</a:t>
+            </a:r>
+          </a:p>
+          <a:p>
+            <a:pPr marL="285750" indent="-285750">
+              <a:buFont typeface="Arial" charset="0"/>
+              <a:buChar char="•"/>
+            </a:pPr>
+            <a:endParaRPr lang="en-US" sz="2400" dirty="0" smtClean="0"/>
+          </a:p>
+          <a:p>
+            <a:pPr marL="285750" indent="-285750">
+              <a:buFont typeface="Arial" charset="0"/>
+              <a:buChar char="•"/>
+            </a:pPr>
+            <a:endParaRPr lang="en-US" sz="2400" dirty="0" smtClean="0"/>
+          </a:p>
+        </p:txBody>
+      </p:sp>
+    </p:spTree>
+    <p:extLst>
+      <p:ext uri="{BB962C8B-B14F-4D97-AF65-F5344CB8AC3E}">
+        <p14:creationId xmlns:p14="http://schemas.microsoft.com/office/powerpoint/2010/main" val="651288027"/>
+      </p:ext>
+    </p:extLst>
+  </p:cSld>
+  <p:clrMapOvr>
+    <a:masterClrMapping/>
+  </p:clrMapOvr>
+  <p:timing>
+    <p:tnLst>
+      <p:par>
+        <p:cTn id="1" dur="indefinite" restart="never" nodeType="tmRoot"/>
+      </p:par>
+    </p:tnLst>
+  </p:timing>
+</p:sld>
+</file>
+
+<file path=ppt/slides/slide3.xml><?xml version="1.0" encoding="utf-8"?>
+<p:sld xmlns:a="http://schemas.openxmlformats.org/drawingml/2006/main" xmlns:r="http://schemas.openxmlformats.org/officeDocument/2006/relationships" xmlns:p="http://schemas.openxmlformats.org/presentationml/2006/main">
+  <p:cSld>
+    <p:spTree>
+      <p:nvGrpSpPr>
+        <p:cNvPr id="1" name=""/>
+        <p:cNvGrpSpPr/>
+        <p:nvPr/>
+      </p:nvGrpSpPr>
+      <p:grpSpPr>
+        <a:xfrm>
+          <a:off x="0" y="0"/>
+          <a:ext cx="0" cy="0"/>
+          <a:chOff x="0" y="0"/>
+          <a:chExt cx="0" cy="0"/>
+        </a:xfrm>
+      </p:grpSpPr>
+      <p:sp>
+        <p:nvSpPr>
+          <p:cNvPr id="2" name="Title 1"/>
+          <p:cNvSpPr>
+            <a:spLocks noGrp="1"/>
+          </p:cNvSpPr>
+          <p:nvPr>
+            <p:ph type="title"/>
+          </p:nvPr>
+        </p:nvSpPr>
+        <p:spPr/>
+        <p:txBody>
+          <a:bodyPr/>
+          <a:lstStyle/>
+          <a:p>
+            <a:r>
+              <a:rPr lang="en-US" dirty="0" smtClean="0"/>
+              <a:t>Use Cases</a:t>
+            </a:r>
+            <a:endParaRPr lang="en-US" dirty="0"/>
+          </a:p>
+        </p:txBody>
+      </p:sp>
+    </p:spTree>
+    <p:extLst>
+      <p:ext uri="{BB962C8B-B14F-4D97-AF65-F5344CB8AC3E}">
+        <p14:creationId xmlns:p14="http://schemas.microsoft.com/office/powerpoint/2010/main" val="1226546432"/>
+      </p:ext>
+    </p:extLst>
+  </p:cSld>
+  <p:clrMapOvr>
+    <a:masterClrMapping/>
+  </p:clrMapOvr>
+  <p:timing>
+    <p:tnLst>
+      <p:par>
+        <p:cTn id="1" dur="indefinite" restart="never" nodeType="tmRoot"/>
+      </p:par>
+    </p:tnLst>
+  </p:timing>
+</p:sld>
+</file>
+
+<file path=ppt/slides/slide4.xml><?xml version="1.0" encoding="utf-8"?>
+<p:sld xmlns:a="http://schemas.openxmlformats.org/drawingml/2006/main" xmlns:r="http://schemas.openxmlformats.org/officeDocument/2006/relationships" xmlns:p="http://schemas.openxmlformats.org/presentationml/2006/main">
+  <p:cSld>
+    <p:spTree>
+      <p:nvGrpSpPr>
+        <p:cNvPr id="1" name=""/>
+        <p:cNvGrpSpPr/>
+        <p:nvPr/>
+      </p:nvGrpSpPr>
+      <p:grpSpPr>
+        <a:xfrm>
+          <a:off x="0" y="0"/>
+          <a:ext cx="0" cy="0"/>
+          <a:chOff x="0" y="0"/>
+          <a:chExt cx="0" cy="0"/>
+        </a:xfrm>
+      </p:grpSpPr>
+      <p:pic>
+        <p:nvPicPr>
+          <p:cNvPr id="3" name="Picture 2"/>
+          <p:cNvPicPr>
+            <a:picLocks noChangeAspect="1"/>
+          </p:cNvPicPr>
+          <p:nvPr/>
+        </p:nvPicPr>
+        <p:blipFill>
+          <a:blip r:embed="rId2">
+            <a:extLst>
+              <a:ext uri="{28A0092B-C50C-407E-A947-70E740481C1C}">
+                <a14:useLocalDpi xmlns:a14="http://schemas.microsoft.com/office/drawing/2010/main" val="0"/>
+              </a:ext>
+            </a:extLst>
+          </a:blip>
+          <a:stretch>
+            <a:fillRect/>
+          </a:stretch>
+        </p:blipFill>
+        <p:spPr>
+          <a:xfrm>
+            <a:off x="1013552" y="-187288"/>
+            <a:ext cx="10267720" cy="7934147"/>
+          </a:xfrm>
+          <a:prstGeom prst="rect">
+            <a:avLst/>
+          </a:prstGeom>
+        </p:spPr>
+      </p:pic>
+    </p:spTree>
+    <p:extLst>
+      <p:ext uri="{BB962C8B-B14F-4D97-AF65-F5344CB8AC3E}">
+        <p14:creationId xmlns:p14="http://schemas.microsoft.com/office/powerpoint/2010/main" val="473721030"/>
+      </p:ext>
+    </p:extLst>
+  </p:cSld>
+  <p:clrMapOvr>
+    <a:masterClrMapping/>
+  </p:clrMapOvr>
+  <p:timing>
+    <p:tnLst>
+      <p:par>
+        <p:cTn id="1" dur="indefinite" restart="never" nodeType="tmRoot"/>
+      </p:par>
+    </p:tnLst>
+  </p:timing>
+</p:sld>
+</file>
+
+<file path=ppt/slides/slide5.xml><?xml version="1.0" encoding="utf-8"?>
+<p:sld xmlns:a="http://schemas.openxmlformats.org/drawingml/2006/main" xmlns:r="http://schemas.openxmlformats.org/officeDocument/2006/relationships" xmlns:p="http://schemas.openxmlformats.org/presentationml/2006/main">
+  <p:cSld>
+    <p:spTree>
+      <p:nvGrpSpPr>
+        <p:cNvPr id="1" name=""/>
+        <p:cNvGrpSpPr/>
+        <p:nvPr/>
+      </p:nvGrpSpPr>
+      <p:grpSpPr>
+        <a:xfrm>
+          <a:off x="0" y="0"/>
+          <a:ext cx="0" cy="0"/>
+          <a:chOff x="0" y="0"/>
+          <a:chExt cx="0" cy="0"/>
+        </a:xfrm>
+      </p:grpSpPr>
+      <p:pic>
+        <p:nvPicPr>
+          <p:cNvPr id="4" name="Picture 3"/>
+          <p:cNvPicPr>
+            <a:picLocks noChangeAspect="1"/>
+          </p:cNvPicPr>
+          <p:nvPr/>
+        </p:nvPicPr>
+        <p:blipFill>
+          <a:blip r:embed="rId2">
+            <a:extLst>
+              <a:ext uri="{28A0092B-C50C-407E-A947-70E740481C1C}">
+                <a14:useLocalDpi xmlns:a14="http://schemas.microsoft.com/office/drawing/2010/main" val="0"/>
+              </a:ext>
+            </a:extLst>
+          </a:blip>
+          <a:stretch>
+            <a:fillRect/>
+          </a:stretch>
+        </p:blipFill>
+        <p:spPr>
+          <a:xfrm>
+            <a:off x="-537441" y="1503967"/>
+            <a:ext cx="13266882" cy="17168905"/>
+          </a:xfrm>
+          <a:prstGeom prst="rect">
+            <a:avLst/>
+          </a:prstGeom>
+        </p:spPr>
+      </p:pic>
+      <p:sp>
+        <p:nvSpPr>
+          <p:cNvPr id="2" name="Title 1"/>
+          <p:cNvSpPr>
+            <a:spLocks noGrp="1"/>
+          </p:cNvSpPr>
+          <p:nvPr>
+            <p:ph type="title"/>
+          </p:nvPr>
+        </p:nvSpPr>
+        <p:spPr/>
+        <p:txBody>
+          <a:bodyPr/>
+          <a:lstStyle/>
+          <a:p>
+            <a:r>
+              <a:rPr lang="en-US" dirty="0" smtClean="0"/>
+              <a:t>System Diagram</a:t>
+            </a:r>
+            <a:endParaRPr lang="en-US" dirty="0"/>
+          </a:p>
+        </p:txBody>
+      </p:sp>
+    </p:spTree>
+    <p:extLst>
+      <p:ext uri="{BB962C8B-B14F-4D97-AF65-F5344CB8AC3E}">
+        <p14:creationId xmlns:p14="http://schemas.microsoft.com/office/powerpoint/2010/main" val="1107471781"/>
+      </p:ext>
+    </p:extLst>
+  </p:cSld>
+  <p:clrMapOvr>
+    <a:masterClrMapping/>
+  </p:clrMapOvr>
+  <p:timing>
+    <p:tnLst>
+      <p:par>
+        <p:cTn id="1" dur="indefinite" restart="never" nodeType="tmRoot"/>
+      </p:par>
+    </p:tnLst>
+  </p:timing>
+</p:sld>
+</file>
+
+<file path=ppt/slides/slide6.xml><?xml version="1.0" encoding="utf-8"?>
+<p:sld xmlns:a="http://schemas.openxmlformats.org/drawingml/2006/main" xmlns:r="http://schemas.openxmlformats.org/officeDocument/2006/relationships" xmlns:p="http://schemas.openxmlformats.org/presentationml/2006/main">
+  <p:cSld>
+    <p:spTree>
+      <p:nvGrpSpPr>
+        <p:cNvPr id="1" name=""/>
+        <p:cNvGrpSpPr/>
+        <p:nvPr/>
+      </p:nvGrpSpPr>
+      <p:grpSpPr>
+        <a:xfrm>
+          <a:off x="0" y="0"/>
+          <a:ext cx="0" cy="0"/>
+          <a:chOff x="0" y="0"/>
+          <a:chExt cx="0" cy="0"/>
+        </a:xfrm>
+      </p:grpSpPr>
+      <p:sp>
+        <p:nvSpPr>
+          <p:cNvPr id="2" name="Title 1"/>
+          <p:cNvSpPr>
+            <a:spLocks noGrp="1"/>
+          </p:cNvSpPr>
+          <p:nvPr>
+            <p:ph type="title"/>
+          </p:nvPr>
+        </p:nvSpPr>
+        <p:spPr/>
+        <p:txBody>
+          <a:bodyPr/>
+          <a:lstStyle/>
+          <a:p>
+            <a:r>
+              <a:rPr lang="en-US" dirty="0" smtClean="0"/>
+              <a:t>Project Demonstration</a:t>
+            </a:r>
+            <a:endParaRPr lang="en-US" dirty="0"/>
+          </a:p>
+        </p:txBody>
+      </p:sp>
+      <p:sp>
+        <p:nvSpPr>
+          <p:cNvPr id="3" name="Content Placeholder 2"/>
+          <p:cNvSpPr>
+            <a:spLocks noGrp="1"/>
+          </p:cNvSpPr>
+          <p:nvPr>
+            <p:ph idx="1"/>
+          </p:nvPr>
+        </p:nvSpPr>
+        <p:spPr/>
+        <p:txBody>
+          <a:bodyPr/>
+          <a:lstStyle/>
+          <a:p>
+            <a:endParaRPr lang="en-US"/>
+          </a:p>
+        </p:txBody>
+      </p:sp>
+    </p:spTree>
+    <p:extLst>
+      <p:ext uri="{BB962C8B-B14F-4D97-AF65-F5344CB8AC3E}">
+        <p14:creationId xmlns:p14="http://schemas.microsoft.com/office/powerpoint/2010/main" val="1264400490"/>
+      </p:ext>
+    </p:extLst>
+  </p:cSld>
+  <p:clrMapOvr>
+    <a:masterClrMapping/>
+  </p:clrMapOvr>
+  <p:timing>
+    <p:tnLst>
+      <p:par>
+        <p:cTn id="1" dur="indefinite" restart="never" nodeType="tmRoot"/>
+      </p:par>
+    </p:tnLst>
+  </p:timing>
+</p:sld>
+</file>
+
+<file path=ppt/slides/slide7.xml><?xml version="1.0" encoding="utf-8"?>
+<p:sld xmlns:a="http://schemas.openxmlformats.org/drawingml/2006/main" xmlns:r="http://schemas.openxmlformats.org/officeDocument/2006/relationships" xmlns:p="http://schemas.openxmlformats.org/presentationml/2006/main">
+  <p:cSld>
+    <p:spTree>
+      <p:nvGrpSpPr>
+        <p:cNvPr id="1" name=""/>
+        <p:cNvGrpSpPr/>
+        <p:nvPr/>
+      </p:nvGrpSpPr>
+      <p:grpSpPr>
+        <a:xfrm>
+          <a:off x="0" y="0"/>
+          <a:ext cx="0" cy="0"/>
+          <a:chOff x="0" y="0"/>
+          <a:chExt cx="0" cy="0"/>
+        </a:xfrm>
+      </p:grpSpPr>
+      <p:sp>
+        <p:nvSpPr>
+          <p:cNvPr id="2" name="Title 1"/>
+          <p:cNvSpPr>
+            <a:spLocks noGrp="1"/>
+          </p:cNvSpPr>
+          <p:nvPr>
+            <p:ph type="title"/>
+          </p:nvPr>
+        </p:nvSpPr>
+        <p:spPr/>
+        <p:txBody>
+          <a:bodyPr/>
+          <a:lstStyle/>
+          <a:p>
+            <a:r>
+              <a:rPr lang="en-US" dirty="0" smtClean="0"/>
+              <a:t>Future Work</a:t>
+            </a:r>
+            <a:endParaRPr lang="en-US" dirty="0"/>
+          </a:p>
+        </p:txBody>
+      </p:sp>
+      <p:sp>
+        <p:nvSpPr>
+          <p:cNvPr id="3" name="Content Placeholder 2"/>
+          <p:cNvSpPr>
+            <a:spLocks noGrp="1"/>
+          </p:cNvSpPr>
+          <p:nvPr>
+            <p:ph idx="1"/>
+          </p:nvPr>
+        </p:nvSpPr>
+        <p:spPr>
+          <a:xfrm>
+            <a:off x="2231136" y="2153412"/>
+            <a:ext cx="7729728" cy="3101983"/>
+          </a:xfrm>
+        </p:spPr>
+        <p:txBody>
+          <a:bodyPr>
+            <a:noAutofit/>
+          </a:bodyPr>
+          <a:lstStyle/>
+          <a:p>
+            <a:r>
+              <a:rPr lang="en-US" sz="2400" dirty="0" smtClean="0"/>
+              <a:t>Add photo and video capabilities to attach to recipes </a:t>
+            </a:r>
+            <a:r>
+              <a:rPr lang="en-US" sz="2400" dirty="0" smtClean="0"/>
+              <a:t>to help create </a:t>
+            </a:r>
+            <a:r>
+              <a:rPr lang="en-US" sz="2400" dirty="0" smtClean="0"/>
+              <a:t>clear and concise instructions.</a:t>
+            </a:r>
+          </a:p>
+          <a:p>
+            <a:r>
+              <a:rPr lang="en-US" sz="2400" dirty="0" smtClean="0"/>
+              <a:t>Add “Spin-Off” recipes to instantly create a different version of an existing recipe.</a:t>
+            </a:r>
+          </a:p>
+          <a:p>
+            <a:r>
+              <a:rPr lang="en-US" sz="2400" dirty="0" smtClean="0"/>
+              <a:t>Add access to the application through a website, so that if a large amount of recipes are to be added (such as from a cookbook), a user can quickly submit the information via the website rather than on their mobile device.</a:t>
+            </a:r>
+          </a:p>
+          <a:p>
+            <a:r>
+              <a:rPr lang="en-US" sz="2400" dirty="0" smtClean="0"/>
+              <a:t>Create an Android version of the application.</a:t>
+            </a:r>
+            <a:endParaRPr lang="en-US" sz="2400" dirty="0"/>
+          </a:p>
+        </p:txBody>
+      </p:sp>
+    </p:spTree>
+    <p:extLst>
+      <p:ext uri="{BB962C8B-B14F-4D97-AF65-F5344CB8AC3E}">
+        <p14:creationId xmlns:p14="http://schemas.microsoft.com/office/powerpoint/2010/main" val="1428348365"/>
+      </p:ext>
+    </p:extLst>
+  </p:cSld>
+  <p:clrMapOvr>
+    <a:masterClrMapping/>
+  </p:clrMapOvr>
+  <p:timing>
+    <p:tnLst>
+      <p:par>
+        <p:cTn id="1" dur="indefinite" restart="never" nodeType="tmRoot"/>
+      </p:par>
+    </p:tnLst>
+  </p:timing>
+</p:sld>
+</file>
+
+<file path=ppt/slides/slide8.xml><?xml version="1.0" encoding="utf-8"?>
+<p:sld xmlns:a="http://schemas.openxmlformats.org/drawingml/2006/main" xmlns:r="http://schemas.openxmlformats.org/officeDocument/2006/relationships" xmlns:p="http://schemas.openxmlformats.org/presentationml/2006/main">
+  <p:cSld>
+    <p:spTree>
+      <p:nvGrpSpPr>
+        <p:cNvPr id="1" name=""/>
+        <p:cNvGrpSpPr/>
+        <p:nvPr/>
+      </p:nvGrpSpPr>
+      <p:grpSpPr>
+        <a:xfrm>
+          <a:off x="0" y="0"/>
+          <a:ext cx="0" cy="0"/>
+          <a:chOff x="0" y="0"/>
+          <a:chExt cx="0" cy="0"/>
+        </a:xfrm>
+      </p:grpSpPr>
+      <p:sp>
+        <p:nvSpPr>
+          <p:cNvPr id="2" name="Title 1"/>
+          <p:cNvSpPr>
+            <a:spLocks noGrp="1"/>
+          </p:cNvSpPr>
+          <p:nvPr>
+            <p:ph type="title"/>
+          </p:nvPr>
+        </p:nvSpPr>
+        <p:spPr/>
+        <p:txBody>
+          <a:bodyPr/>
+          <a:lstStyle/>
+          <a:p>
+            <a:r>
+              <a:rPr lang="en-US" dirty="0" smtClean="0"/>
+              <a:t>Questions?</a:t>
+            </a:r>
+            <a:endParaRPr lang="en-US" dirty="0"/>
+          </a:p>
+        </p:txBody>
+      </p:sp>
+      <p:sp>
+        <p:nvSpPr>
+          <p:cNvPr id="3" name="Content Placeholder 2"/>
+          <p:cNvSpPr>
+            <a:spLocks noGrp="1"/>
+          </p:cNvSpPr>
+          <p:nvPr>
+            <p:ph idx="1"/>
+          </p:nvPr>
+        </p:nvSpPr>
+        <p:spPr/>
+        <p:txBody>
+          <a:bodyPr/>
+          <a:lstStyle/>
+          <a:p>
+            <a:pPr algn="ctr"/>
+            <a:r>
+              <a:rPr lang="en-US" dirty="0" smtClean="0"/>
+              <a:t>Thank you for taking the time to attend to this presentation about the </a:t>
+            </a:r>
+            <a:r>
+              <a:rPr lang="en-US" dirty="0" err="1" smtClean="0"/>
+              <a:t>CookIt</a:t>
+            </a:r>
+            <a:r>
+              <a:rPr lang="en-US" dirty="0" smtClean="0"/>
+              <a:t> iPhone Application.</a:t>
+            </a:r>
+            <a:endParaRPr lang="en-US" dirty="0"/>
+          </a:p>
+        </p:txBody>
+      </p:sp>
+    </p:spTree>
+    <p:extLst>
+      <p:ext uri="{BB962C8B-B14F-4D97-AF65-F5344CB8AC3E}">
+        <p14:creationId xmlns:p14="http://schemas.microsoft.com/office/powerpoint/2010/main" val="604367372"/>
+      </p:ext>
+    </p:extLst>
+  </p:cSld>
+  <p:clrMapOvr>
+    <a:masterClrMapping/>
+  </p:clrMapOvr>
+  <p:timing>
+    <p:tnLst>
+      <p:par>
+        <p:cTn id="1" dur="indefinite" restart="never" nodeType="tmRoot"/>
+      </p:par>
+    </p:tnLst>
+  </p:timing>
 </p:sld>
 </file>
 

</xml_diff>